<commit_message>
add gcc & make ...
</commit_message>
<xml_diff>
--- a/ch2/ch2-5.pptx
+++ b/ch2/ch2-5.pptx
@@ -124,6 +124,11 @@
       </a:defRPr>
     </a:lvl9pPr>
   </p:defaultTextStyle>
+  <p:extLst>
+    <p:ext uri="{EFAFB233-063F-42B5-8137-9DF3F51BA10A}">
+      <p15:sldGuideLst xmlns:p15="http://schemas.microsoft.com/office/powerpoint/2012/main"/>
+    </p:ext>
+  </p:extLst>
 </p:presentation>
 </file>
 
@@ -5811,12 +5816,20 @@
               <a:buChar char="Ø"/>
             </a:pPr>
             <a:r>
+              <a:rPr kumimoji="1" lang="zh-CN" altLang="en-US" dirty="0"/>
+              <a:t> </a:t>
+            </a:r>
+            <a:r>
               <a:rPr kumimoji="1" lang="en-US" altLang="zh-CN" dirty="0" err="1"/>
               <a:t>Makefile</a:t>
             </a:r>
             <a:r>
               <a:rPr kumimoji="1" lang="zh-CN" altLang="en-US" dirty="0"/>
-              <a:t>文件介绍</a:t>
+              <a:t>文件介绍（自学，我们</a:t>
+            </a:r>
+            <a:r>
+              <a:rPr kumimoji="1" lang="zh-CN" altLang="en-US"/>
+              <a:t>找同学讲）</a:t>
             </a:r>
             <a:endParaRPr kumimoji="1" lang="en-US" altLang="zh-CN" dirty="0"/>
           </a:p>
@@ -5837,6 +5850,19 @@
               <a:rPr kumimoji="1" lang="zh-CN" altLang="en-US" dirty="0"/>
               <a:t>编译介绍</a:t>
             </a:r>
+            <a:r>
+              <a:rPr kumimoji="1" lang="en-US" altLang="zh-CN" dirty="0"/>
+              <a:t>(</a:t>
+            </a:r>
+            <a:r>
+              <a:rPr kumimoji="1" lang="zh-CN" altLang="en-US" dirty="0"/>
+              <a:t>自学</a:t>
+            </a:r>
+            <a:r>
+              <a:rPr kumimoji="1" lang="en-US" altLang="zh-CN" dirty="0"/>
+              <a:t>)</a:t>
+            </a:r>
+            <a:endParaRPr kumimoji="1" lang="zh-CN" altLang="en-US" dirty="0"/>
           </a:p>
           <a:p>
             <a:pPr>

</xml_diff>